<commit_message>
dark mode now toggles, added asset, added content
</commit_message>
<xml_diff>
--- a/term-project-presentation.pptx
+++ b/term-project-presentation.pptx
@@ -10,6 +10,7 @@
     <p:sldId id="256" r:id="rId5"/>
     <p:sldId id="257" r:id="rId6"/>
     <p:sldId id="258" r:id="rId7"/>
+    <p:sldId id="259" r:id="rId8"/>
   </p:sldIdLst>
   <p:sldSz cx="10080625" cy="5670550"/>
   <p:notesSz cx="7559675" cy="10691813"/>
@@ -67,7 +68,7 @@
         <p:txBody>
           <a:bodyPr/>
           <a:p>
-            <a:fld id="{02C040C7-B656-475A-B285-24456F4E7E8D}" type="slidenum">
+            <a:fld id="{366055ED-72B7-4EBB-94BD-B745543BF593}" type="slidenum">
               <a:t>&lt;#&gt;</a:t>
             </a:fld>
           </a:p>
@@ -276,7 +277,7 @@
         <p:txBody>
           <a:bodyPr/>
           <a:p>
-            <a:fld id="{775C720F-79F2-436F-B0A9-5BAB2444AB87}" type="slidenum">
+            <a:fld id="{D263E6F3-A0E0-4372-A78B-04F5AC7F8299}" type="slidenum">
               <a:t>&lt;#&gt;</a:t>
             </a:fld>
           </a:p>
@@ -571,7 +572,7 @@
         <p:txBody>
           <a:bodyPr/>
           <a:p>
-            <a:fld id="{7177DDFF-CB70-4DB5-8767-6FE811411DDE}" type="slidenum">
+            <a:fld id="{8582EB6E-C48F-4E14-9E3F-8406D7796576}" type="slidenum">
               <a:t>&lt;#&gt;</a:t>
             </a:fld>
           </a:p>
@@ -952,7 +953,7 @@
         <p:txBody>
           <a:bodyPr/>
           <a:p>
-            <a:fld id="{F9789C98-B2AE-43F1-987E-6A6CAD0DAFB8}" type="slidenum">
+            <a:fld id="{B227C843-C5DC-4B75-8E6B-9DD50ED0FD35}" type="slidenum">
               <a:t>&lt;#&gt;</a:t>
             </a:fld>
           </a:p>
@@ -1035,7 +1036,7 @@
         <p:txBody>
           <a:bodyPr/>
           <a:p>
-            <a:fld id="{466A5049-A387-4811-86F1-9EF6690D56D7}" type="slidenum">
+            <a:fld id="{BD897A57-A3BC-4FD8-94AD-6B75EADE4F5B}" type="slidenum">
               <a:t>&lt;#&gt;</a:t>
             </a:fld>
           </a:p>
@@ -1198,7 +1199,7 @@
         <p:txBody>
           <a:bodyPr/>
           <a:p>
-            <a:fld id="{218183EB-0547-4E02-B2D8-528067F1C1A4}" type="slidenum">
+            <a:fld id="{3F8150FB-9A77-4146-8A46-8F861B35E7C4}" type="slidenum">
               <a:t>&lt;#&gt;</a:t>
             </a:fld>
           </a:p>
@@ -1364,7 +1365,7 @@
         <p:txBody>
           <a:bodyPr/>
           <a:p>
-            <a:fld id="{444D911E-5EC1-4909-A468-4BD63DBD5DD5}" type="slidenum">
+            <a:fld id="{6B5AD3FE-8B6C-4E99-ADA2-A7374C8ED8B9}" type="slidenum">
               <a:t>&lt;#&gt;</a:t>
             </a:fld>
           </a:p>
@@ -1573,7 +1574,7 @@
         <p:txBody>
           <a:bodyPr/>
           <a:p>
-            <a:fld id="{8C5DAAE1-C43B-4399-B56D-B3C4121EDC77}" type="slidenum">
+            <a:fld id="{1D3C8929-D890-4C3D-B81F-9F2A8CD48842}" type="slidenum">
               <a:t>&lt;#&gt;</a:t>
             </a:fld>
           </a:p>
@@ -1696,7 +1697,7 @@
         <p:txBody>
           <a:bodyPr/>
           <a:p>
-            <a:fld id="{8037B617-65CC-40B7-BEF6-B7C65FDA926E}" type="slidenum">
+            <a:fld id="{67711F2D-58A2-470F-9DB9-DF6FF48BD077}" type="slidenum">
               <a:t>&lt;#&gt;</a:t>
             </a:fld>
           </a:p>
@@ -1817,7 +1818,7 @@
         <p:txBody>
           <a:bodyPr/>
           <a:p>
-            <a:fld id="{8B3EB2E9-9200-45A8-BDA4-E145F81ABCD2}" type="slidenum">
+            <a:fld id="{82F7E937-5E9D-4655-BC3A-81BBADC960E6}" type="slidenum">
               <a:t>&lt;#&gt;</a:t>
             </a:fld>
           </a:p>
@@ -2069,7 +2070,7 @@
         <p:txBody>
           <a:bodyPr/>
           <a:p>
-            <a:fld id="{10021248-A988-4C8C-95E2-B745A6915A18}" type="slidenum">
+            <a:fld id="{977F2B82-6B38-4F22-A0C0-FCD88053EA8C}" type="slidenum">
               <a:t>&lt;#&gt;</a:t>
             </a:fld>
           </a:p>
@@ -2232,7 +2233,7 @@
         <p:txBody>
           <a:bodyPr/>
           <a:p>
-            <a:fld id="{92E40D35-5923-4F09-9758-4B970896D493}" type="slidenum">
+            <a:fld id="{31B33023-269F-476C-A1E1-93AA42D6223E}" type="slidenum">
               <a:t>&lt;#&gt;</a:t>
             </a:fld>
           </a:p>
@@ -2484,7 +2485,7 @@
         <p:txBody>
           <a:bodyPr/>
           <a:p>
-            <a:fld id="{421C7450-D0BE-4129-AD23-7FCD691B9F74}" type="slidenum">
+            <a:fld id="{6D437366-E288-4360-B97F-C0B0949C46B4}" type="slidenum">
               <a:t>&lt;#&gt;</a:t>
             </a:fld>
           </a:p>
@@ -2736,7 +2737,7 @@
         <p:txBody>
           <a:bodyPr/>
           <a:p>
-            <a:fld id="{0EC10C99-34F6-4488-A821-E5175634037D}" type="slidenum">
+            <a:fld id="{09535195-7C76-4773-9CCF-D9BE1B181BAD}" type="slidenum">
               <a:t>&lt;#&gt;</a:t>
             </a:fld>
           </a:p>
@@ -2945,7 +2946,7 @@
         <p:txBody>
           <a:bodyPr/>
           <a:p>
-            <a:fld id="{F4929C38-BD4D-417C-B8CC-8141CE3C083D}" type="slidenum">
+            <a:fld id="{DE7C0780-7747-4372-8CD0-13261C2637BE}" type="slidenum">
               <a:t>&lt;#&gt;</a:t>
             </a:fld>
           </a:p>
@@ -3240,7 +3241,7 @@
         <p:txBody>
           <a:bodyPr/>
           <a:p>
-            <a:fld id="{308A4FC4-B464-4CEE-B841-0916B0F80CE6}" type="slidenum">
+            <a:fld id="{D7A4264C-63C3-4297-8407-3D996B53A2BB}" type="slidenum">
               <a:t>&lt;#&gt;</a:t>
             </a:fld>
           </a:p>
@@ -3621,7 +3622,7 @@
         <p:txBody>
           <a:bodyPr/>
           <a:p>
-            <a:fld id="{70D6FEF2-1821-40D3-B8DF-C16D10010D23}" type="slidenum">
+            <a:fld id="{87A91A9C-BA98-4BBA-82D6-F8D48CCA6B19}" type="slidenum">
               <a:t>&lt;#&gt;</a:t>
             </a:fld>
           </a:p>
@@ -3704,7 +3705,7 @@
         <p:txBody>
           <a:bodyPr/>
           <a:p>
-            <a:fld id="{DF1E6568-5968-4449-8A65-175497D5B1A0}" type="slidenum">
+            <a:fld id="{03C5D0A9-B563-4220-AABA-695D53B1C484}" type="slidenum">
               <a:t>&lt;#&gt;</a:t>
             </a:fld>
           </a:p>
@@ -3867,7 +3868,7 @@
         <p:txBody>
           <a:bodyPr/>
           <a:p>
-            <a:fld id="{87562878-75C1-4139-B8EF-BF3130171BAC}" type="slidenum">
+            <a:fld id="{7193F0AA-AF01-4FA6-9E89-A04638693EBD}" type="slidenum">
               <a:t>&lt;#&gt;</a:t>
             </a:fld>
           </a:p>
@@ -4033,7 +4034,7 @@
         <p:txBody>
           <a:bodyPr/>
           <a:p>
-            <a:fld id="{500515A1-595D-4D23-A2AA-019BC09CE2AC}" type="slidenum">
+            <a:fld id="{3D9249FF-C126-4436-A0E6-2EAB2205114A}" type="slidenum">
               <a:t>&lt;#&gt;</a:t>
             </a:fld>
           </a:p>
@@ -4242,7 +4243,7 @@
         <p:txBody>
           <a:bodyPr/>
           <a:p>
-            <a:fld id="{48364AE9-20C2-4667-A0A0-D50F6F47A426}" type="slidenum">
+            <a:fld id="{CD633160-7CCF-4815-A29E-E130030C10E3}" type="slidenum">
               <a:t>&lt;#&gt;</a:t>
             </a:fld>
           </a:p>
@@ -4365,7 +4366,7 @@
         <p:txBody>
           <a:bodyPr/>
           <a:p>
-            <a:fld id="{0F06717F-FA71-4501-AD2C-2FE2CE77BD51}" type="slidenum">
+            <a:fld id="{EF36DC79-AEF0-4C85-AC80-CDE537C324CE}" type="slidenum">
               <a:t>&lt;#&gt;</a:t>
             </a:fld>
           </a:p>
@@ -4531,7 +4532,7 @@
         <p:txBody>
           <a:bodyPr/>
           <a:p>
-            <a:fld id="{579C917B-B584-4B02-A1D7-258B8A366D6C}" type="slidenum">
+            <a:fld id="{EF991D71-4101-41CD-A523-F63CCE7BFC67}" type="slidenum">
               <a:t>&lt;#&gt;</a:t>
             </a:fld>
           </a:p>
@@ -4652,7 +4653,7 @@
         <p:txBody>
           <a:bodyPr/>
           <a:p>
-            <a:fld id="{BD365401-EC79-4774-8741-B833F73139AB}" type="slidenum">
+            <a:fld id="{A6289076-390A-4DBF-8552-543F2A546E02}" type="slidenum">
               <a:t>&lt;#&gt;</a:t>
             </a:fld>
           </a:p>
@@ -4904,7 +4905,7 @@
         <p:txBody>
           <a:bodyPr/>
           <a:p>
-            <a:fld id="{2268FF3E-6F91-4A57-B6CF-9A8C1A301D4E}" type="slidenum">
+            <a:fld id="{92FDB217-0DF9-4F95-80C0-60649CFDD1A8}" type="slidenum">
               <a:t>&lt;#&gt;</a:t>
             </a:fld>
           </a:p>
@@ -5156,7 +5157,7 @@
         <p:txBody>
           <a:bodyPr/>
           <a:p>
-            <a:fld id="{804D018E-5012-4945-B158-50A9B6411264}" type="slidenum">
+            <a:fld id="{C2D57092-DDF0-4B77-8A62-2C0E5568AEA4}" type="slidenum">
               <a:t>&lt;#&gt;</a:t>
             </a:fld>
           </a:p>
@@ -5408,7 +5409,7 @@
         <p:txBody>
           <a:bodyPr/>
           <a:p>
-            <a:fld id="{49B9B91B-7DC4-4489-BA49-3B76C70BE89C}" type="slidenum">
+            <a:fld id="{D33A5E67-BCEC-44C3-8CE9-D9B56D6E2791}" type="slidenum">
               <a:t>&lt;#&gt;</a:t>
             </a:fld>
           </a:p>
@@ -5617,7 +5618,7 @@
         <p:txBody>
           <a:bodyPr/>
           <a:p>
-            <a:fld id="{A31F19C8-D785-459F-8CEF-E63278D3084B}" type="slidenum">
+            <a:fld id="{DC986C27-81C2-4784-BA32-7467FD136A37}" type="slidenum">
               <a:t>&lt;#&gt;</a:t>
             </a:fld>
           </a:p>
@@ -5912,7 +5913,7 @@
         <p:txBody>
           <a:bodyPr/>
           <a:p>
-            <a:fld id="{544DC600-6C69-4A82-B7CF-91BFE9C42CBE}" type="slidenum">
+            <a:fld id="{25C47C9D-5DB9-40C3-A170-72951B430697}" type="slidenum">
               <a:t>&lt;#&gt;</a:t>
             </a:fld>
           </a:p>
@@ -6293,7 +6294,7 @@
         <p:txBody>
           <a:bodyPr/>
           <a:p>
-            <a:fld id="{3D65B8F9-EE00-4236-BA66-CF4275E05ECA}" type="slidenum">
+            <a:fld id="{0D776E9C-6D77-4A39-8953-81722B5132E5}" type="slidenum">
               <a:t>&lt;#&gt;</a:t>
             </a:fld>
           </a:p>
@@ -6502,7 +6503,7 @@
         <p:txBody>
           <a:bodyPr/>
           <a:p>
-            <a:fld id="{426C9F61-F63F-4478-9D57-90B82F54E193}" type="slidenum">
+            <a:fld id="{E975ACA5-D291-4E6E-B921-3100D55A3734}" type="slidenum">
               <a:t>&lt;#&gt;</a:t>
             </a:fld>
           </a:p>
@@ -6625,7 +6626,7 @@
         <p:txBody>
           <a:bodyPr/>
           <a:p>
-            <a:fld id="{E4AA84B5-C4F2-47A7-B35A-C99B86AC9C2C}" type="slidenum">
+            <a:fld id="{94411302-6856-4C0F-B80F-1FD33AAECB5E}" type="slidenum">
               <a:t>&lt;#&gt;</a:t>
             </a:fld>
           </a:p>
@@ -6746,7 +6747,7 @@
         <p:txBody>
           <a:bodyPr/>
           <a:p>
-            <a:fld id="{35572930-2122-4A9E-BF6C-A3C466E17661}" type="slidenum">
+            <a:fld id="{8ECB8AD1-DB8A-4AE9-9F4E-A199A9C488A0}" type="slidenum">
               <a:t>&lt;#&gt;</a:t>
             </a:fld>
           </a:p>
@@ -6998,7 +6999,7 @@
         <p:txBody>
           <a:bodyPr/>
           <a:p>
-            <a:fld id="{8A26879E-CE73-43F1-8FFE-F83BB0D8121D}" type="slidenum">
+            <a:fld id="{FE788FE0-20F5-4F93-81E6-DD9551FBBFCC}" type="slidenum">
               <a:t>&lt;#&gt;</a:t>
             </a:fld>
           </a:p>
@@ -7250,7 +7251,7 @@
         <p:txBody>
           <a:bodyPr/>
           <a:p>
-            <a:fld id="{84C67A9D-D659-4185-80A0-2F834A55086F}" type="slidenum">
+            <a:fld id="{B6ADB62A-BAC5-4CEA-AB44-EA2B5451C47A}" type="slidenum">
               <a:t>&lt;#&gt;</a:t>
             </a:fld>
           </a:p>
@@ -7502,7 +7503,7 @@
         <p:txBody>
           <a:bodyPr/>
           <a:p>
-            <a:fld id="{BC8D4920-D5FD-4BD2-90C8-8995A61F8BCE}" type="slidenum">
+            <a:fld id="{6D8F4045-6628-4D0B-8A5F-5724DD72EB14}" type="slidenum">
               <a:t>&lt;#&gt;</a:t>
             </a:fld>
           </a:p>
@@ -8036,7 +8037,7 @@
             <a:pPr indent="0" algn="r">
               <a:buNone/>
             </a:pPr>
-            <a:fld id="{7854A63B-FBE5-4C45-84C9-485F80DA4350}" type="slidenum">
+            <a:fld id="{A87C739A-8BF7-4EA5-962D-DBE75CEDF48D}" type="slidenum">
               <a:rPr b="0" lang="en-US" sz="1400" spc="-1" strike="noStrike">
                 <a:solidFill>
                   <a:srgbClr val="ffffff"/>
@@ -8735,7 +8736,7 @@
           </a:bodyPr>
           <a:p>
             <a:pPr algn="r"/>
-            <a:fld id="{ADBAC14E-1AB2-4C10-B921-A14FC1274C87}" type="slidenum">
+            <a:fld id="{C8BA2C84-C53D-4F78-A7E7-5D4D75414E6E}" type="slidenum">
               <a:rPr b="0" lang="en-US" sz="1400" spc="-1" strike="noStrike">
                 <a:solidFill>
                   <a:srgbClr val="ffffff"/>
@@ -9666,7 +9667,7 @@
             <a:pPr indent="0" algn="r">
               <a:buNone/>
             </a:pPr>
-            <a:fld id="{52A8DE17-4008-4DFD-BDB7-7B4772E4E3F8}" type="slidenum">
+            <a:fld id="{B73359FB-3E8D-473F-B75A-0EE7A202292B}" type="slidenum">
               <a:rPr b="0" lang="en-US" sz="1400" spc="-1" strike="noStrike">
                 <a:solidFill>
                   <a:srgbClr val="ffffff"/>
@@ -9933,7 +9934,7 @@
           </a:bodyPr>
           <a:p>
             <a:pPr algn="r"/>
-            <a:fld id="{913FE5AE-74CD-4658-8CDB-2B64B973670C}" type="slidenum">
+            <a:fld id="{5E4C91DA-0B30-4831-9856-03BF118E286A}" type="slidenum">
               <a:rPr b="0" lang="en-US" sz="1400" spc="-1" strike="noStrike">
                 <a:solidFill>
                   <a:srgbClr val="000000"/>
@@ -10559,7 +10560,7 @@
             <a:pPr indent="0" algn="r">
               <a:buNone/>
             </a:pPr>
-            <a:fld id="{70F052BC-A007-4D54-B137-7EF18BEEE01E}" type="slidenum">
+            <a:fld id="{D06FD29D-1619-4D8C-BB12-124BA05DEEF6}" type="slidenum">
               <a:rPr b="0" lang="en-US" sz="1400" spc="-1" strike="noStrike">
                 <a:solidFill>
                   <a:srgbClr val="000000"/>
@@ -10646,7 +10647,7 @@
               <a:buNone/>
             </a:pPr>
             <a:r>
-              <a:rPr b="0" lang="en-US" sz="3300" spc="-1" strike="noStrike">
+              <a:rPr b="0" lang="en-US" sz="4200" spc="-1" strike="noStrike">
                 <a:solidFill>
                   <a:srgbClr val="ffffff"/>
                 </a:solidFill>
@@ -10654,7 +10655,7 @@
               </a:rPr>
               <a:t>Pace Website: Remastered</a:t>
             </a:r>
-            <a:endParaRPr b="0" lang="en-US" sz="3300" spc="-1" strike="noStrike">
+            <a:endParaRPr b="0" lang="en-US" sz="4200" spc="-1" strike="noStrike">
               <a:solidFill>
                 <a:srgbClr val="ffffff"/>
               </a:solidFill>
@@ -10701,7 +10702,25 @@
                 </a:solidFill>
                 <a:latin typeface="Arial"/>
               </a:rPr>
-              <a:t>By Sebastian Roman, Aaron Metsch, ChatGPT (GUID Pertition Table)</a:t>
+              <a:t>By Sebastian Roman,</a:t>
+            </a:r>
+            <a:r>
+              <a:rPr b="0" lang="en-US" sz="2400" spc="-1" strike="sngStrike">
+                <a:solidFill>
+                  <a:srgbClr val="ffffff"/>
+                </a:solidFill>
+                <a:latin typeface="Arial"/>
+              </a:rPr>
+              <a:t> Aaron Metsch</a:t>
+            </a:r>
+            <a:r>
+              <a:rPr b="0" lang="en-US" sz="2400" spc="-1" strike="noStrike">
+                <a:solidFill>
+                  <a:srgbClr val="ffffff"/>
+                </a:solidFill>
+                <a:latin typeface="Arial"/>
+              </a:rPr>
+              <a:t> ChatGPT</a:t>
             </a:r>
             <a:endParaRPr b="0" lang="en-US" sz="2400" spc="-1" strike="noStrike">
               <a:solidFill>
@@ -10773,6 +10792,15 @@
             <a:pPr indent="0" algn="ctr">
               <a:buNone/>
             </a:pPr>
+            <a:r>
+              <a:rPr b="0" lang="en-US" sz="3300" spc="-1" strike="noStrike">
+                <a:solidFill>
+                  <a:srgbClr val="ffffff"/>
+                </a:solidFill>
+                <a:latin typeface="Arial"/>
+              </a:rPr>
+              <a:t>Why?</a:t>
+            </a:r>
             <a:endParaRPr b="0" lang="en-US" sz="3300" spc="-1" strike="noStrike">
               <a:solidFill>
                 <a:srgbClr val="ffffff"/>
@@ -10794,8 +10822,8 @@
         </p:nvSpPr>
         <p:spPr>
           <a:xfrm>
-            <a:off x="540000" y="1440000"/>
-            <a:ext cx="9000000" cy="3600000"/>
+            <a:off x="540000" y="2057400"/>
+            <a:ext cx="9000000" cy="2982600"/>
           </a:xfrm>
           <a:prstGeom prst="rect">
             <a:avLst/>
@@ -10810,12 +10838,133 @@
             <a:normAutofit/>
           </a:bodyPr>
           <a:p>
-            <a:pPr indent="0">
+            <a:pPr marL="432000" indent="0">
               <a:spcAft>
                 <a:spcPts val="1057"/>
               </a:spcAft>
               <a:buNone/>
             </a:pPr>
+            <a:r>
+              <a:rPr b="0" lang="en-US" sz="2400" spc="-1" strike="noStrike">
+                <a:solidFill>
+                  <a:srgbClr val="000000"/>
+                </a:solidFill>
+                <a:latin typeface="Arial"/>
+              </a:rPr>
+              <a:t>The Pace website has major UX issues:</a:t>
+            </a:r>
+            <a:endParaRPr b="0" lang="en-US" sz="2400" spc="-1" strike="noStrike">
+              <a:solidFill>
+                <a:srgbClr val="000000"/>
+              </a:solidFill>
+              <a:latin typeface="Arial"/>
+            </a:endParaRPr>
+          </a:p>
+          <a:p>
+            <a:pPr marL="432000" indent="-324000">
+              <a:spcAft>
+                <a:spcPts val="1057"/>
+              </a:spcAft>
+              <a:buClr>
+                <a:srgbClr val="000000"/>
+              </a:buClr>
+              <a:buSzPct val="45000"/>
+              <a:buFont typeface="Wingdings" charset="2"/>
+              <a:buChar char=""/>
+            </a:pPr>
+            <a:r>
+              <a:rPr b="0" lang="en-US" sz="2400" spc="-1" strike="noStrike">
+                <a:solidFill>
+                  <a:srgbClr val="000000"/>
+                </a:solidFill>
+                <a:latin typeface="Arial"/>
+              </a:rPr>
+              <a:t>Bloated</a:t>
+            </a:r>
+            <a:endParaRPr b="0" lang="en-US" sz="2400" spc="-1" strike="noStrike">
+              <a:solidFill>
+                <a:srgbClr val="000000"/>
+              </a:solidFill>
+              <a:latin typeface="Arial"/>
+            </a:endParaRPr>
+          </a:p>
+          <a:p>
+            <a:pPr marL="432000" indent="-324000">
+              <a:spcAft>
+                <a:spcPts val="1057"/>
+              </a:spcAft>
+              <a:buClr>
+                <a:srgbClr val="000000"/>
+              </a:buClr>
+              <a:buSzPct val="45000"/>
+              <a:buFont typeface="Wingdings" charset="2"/>
+              <a:buChar char=""/>
+            </a:pPr>
+            <a:r>
+              <a:rPr b="0" lang="en-US" sz="2400" spc="-1" strike="noStrike">
+                <a:solidFill>
+                  <a:srgbClr val="000000"/>
+                </a:solidFill>
+                <a:latin typeface="Arial"/>
+              </a:rPr>
+              <a:t>Cluttered</a:t>
+            </a:r>
+            <a:endParaRPr b="0" lang="en-US" sz="2400" spc="-1" strike="noStrike">
+              <a:solidFill>
+                <a:srgbClr val="000000"/>
+              </a:solidFill>
+              <a:latin typeface="Arial"/>
+            </a:endParaRPr>
+          </a:p>
+          <a:p>
+            <a:pPr marL="432000" indent="-324000">
+              <a:spcAft>
+                <a:spcPts val="1057"/>
+              </a:spcAft>
+              <a:buClr>
+                <a:srgbClr val="000000"/>
+              </a:buClr>
+              <a:buSzPct val="45000"/>
+              <a:buFont typeface="Wingdings" charset="2"/>
+              <a:buChar char=""/>
+            </a:pPr>
+            <a:r>
+              <a:rPr b="0" lang="en-US" sz="2400" spc="-1" strike="noStrike">
+                <a:solidFill>
+                  <a:srgbClr val="000000"/>
+                </a:solidFill>
+                <a:latin typeface="Arial"/>
+              </a:rPr>
+              <a:t>Slow</a:t>
+            </a:r>
+            <a:endParaRPr b="0" lang="en-US" sz="2400" spc="-1" strike="noStrike">
+              <a:solidFill>
+                <a:srgbClr val="000000"/>
+              </a:solidFill>
+              <a:latin typeface="Arial"/>
+            </a:endParaRPr>
+          </a:p>
+          <a:p>
+            <a:pPr marL="432000" indent="-324000">
+              <a:spcAft>
+                <a:spcPts val="1057"/>
+              </a:spcAft>
+              <a:buClr>
+                <a:srgbClr val="000000"/>
+              </a:buClr>
+              <a:buSzPct val="45000"/>
+              <a:buFont typeface="Wingdings" charset="2"/>
+              <a:buChar char=""/>
+            </a:pPr>
+            <a:r>
+              <a:rPr b="0" lang="en-US" sz="2400" spc="-1" strike="noStrike">
+                <a:solidFill>
+                  <a:srgbClr val="000000"/>
+                </a:solidFill>
+                <a:latin typeface="Arial"/>
+              </a:rPr>
+              <a:t>Needs “www.” for some reason</a:t>
+            </a:r>
             <a:endParaRPr b="0" lang="en-US" sz="2400" spc="-1" strike="noStrike">
               <a:solidFill>
                 <a:srgbClr val="000000"/>
@@ -10867,6 +11016,85 @@
         </p:nvSpPr>
         <p:spPr>
           <a:xfrm>
+            <a:off x="504000" y="1428840"/>
+            <a:ext cx="9071640" cy="2914560"/>
+          </a:xfrm>
+          <a:prstGeom prst="rect">
+            <a:avLst/>
+          </a:prstGeom>
+          <a:noFill/>
+          <a:ln w="0">
+            <a:noFill/>
+          </a:ln>
+        </p:spPr>
+        <p:txBody>
+          <a:bodyPr lIns="0" rIns="0" tIns="0" bIns="0" anchor="ctr">
+            <a:noAutofit/>
+          </a:bodyPr>
+          <a:p>
+            <a:pPr indent="0" algn="ctr">
+              <a:buNone/>
+            </a:pPr>
+            <a:r>
+              <a:rPr b="0" lang="en-US" sz="7200" spc="-1" strike="noStrike">
+                <a:solidFill>
+                  <a:srgbClr val="ffffff"/>
+                </a:solidFill>
+                <a:latin typeface="Arial"/>
+              </a:rPr>
+              <a:t>Demonstration</a:t>
+            </a:r>
+            <a:endParaRPr b="0" lang="en-US" sz="7200" spc="-1" strike="noStrike">
+              <a:solidFill>
+                <a:srgbClr val="ffffff"/>
+              </a:solidFill>
+              <a:latin typeface="Arial"/>
+            </a:endParaRPr>
+          </a:p>
+        </p:txBody>
+      </p:sp>
+    </p:spTree>
+  </p:cSld>
+  <mc:AlternateContent>
+    <mc:Choice Requires="p14">
+      <p:transition spd="slow" p14:dur="2000"/>
+    </mc:Choice>
+    <mc:Fallback>
+      <p:transition spd="slow"/>
+    </mc:Fallback>
+  </mc:AlternateContent>
+</p:sld>
+</file>
+
+<file path=ppt/slides/slide4.xml><?xml version="1.0" encoding="utf-8"?>
+<p:sld xmlns:a="http://schemas.openxmlformats.org/drawingml/2006/main" xmlns:p="http://schemas.openxmlformats.org/presentationml/2006/main" xmlns:r="http://schemas.openxmlformats.org/officeDocument/2006/relationships" xmlns:p14="http://schemas.microsoft.com/office/powerpoint/2010/main" xmlns:p15="http://schemas.microsoft.com/office/powerpoint/2012/main" xmlns:mc="http://schemas.openxmlformats.org/markup-compatibility/2006">
+  <p:cSld>
+    <p:spTree>
+      <p:nvGrpSpPr>
+        <p:cNvPr id="1" name=""/>
+        <p:cNvGrpSpPr/>
+        <p:nvPr/>
+      </p:nvGrpSpPr>
+      <p:grpSpPr>
+        <a:xfrm>
+          <a:off x="0" y="0"/>
+          <a:ext cx="0" cy="0"/>
+          <a:chOff x="0" y="0"/>
+          <a:chExt cx="0" cy="0"/>
+        </a:xfrm>
+      </p:grpSpPr>
+      <p:sp>
+        <p:nvSpPr>
+          <p:cNvPr id="164" name="PlaceHolder 1"/>
+          <p:cNvSpPr>
+            <a:spLocks noGrp="1"/>
+          </p:cNvSpPr>
+          <p:nvPr>
+            <p:ph type="title"/>
+          </p:nvPr>
+        </p:nvSpPr>
+        <p:spPr>
+          <a:xfrm>
             <a:off x="540000" y="270000"/>
             <a:ext cx="9000000" cy="990000"/>
           </a:xfrm>
@@ -10886,6 +11114,15 @@
             <a:pPr indent="0" algn="ctr">
               <a:buNone/>
             </a:pPr>
+            <a:r>
+              <a:rPr b="0" lang="en-US" sz="3300" spc="-1" strike="noStrike">
+                <a:solidFill>
+                  <a:srgbClr val="ffffff"/>
+                </a:solidFill>
+                <a:latin typeface="Arial"/>
+              </a:rPr>
+              <a:t>Questions?</a:t>
+            </a:r>
             <a:endParaRPr b="0" lang="en-US" sz="3300" spc="-1" strike="noStrike">
               <a:solidFill>
                 <a:srgbClr val="ffffff"/>
@@ -10897,7 +11134,7 @@
       </p:sp>
       <p:sp>
         <p:nvSpPr>
-          <p:cNvPr id="164" name="PlaceHolder 2"/>
+          <p:cNvPr id="165" name="PlaceHolder 2"/>
           <p:cNvSpPr>
             <a:spLocks noGrp="1"/>
           </p:cNvSpPr>

</xml_diff>

<commit_message>
more slides in presentation
</commit_message>
<xml_diff>
--- a/term-project-presentation.pptx
+++ b/term-project-presentation.pptx
@@ -11,6 +11,10 @@
     <p:sldId id="257" r:id="rId6"/>
     <p:sldId id="258" r:id="rId7"/>
     <p:sldId id="259" r:id="rId8"/>
+    <p:sldId id="260" r:id="rId9"/>
+    <p:sldId id="261" r:id="rId10"/>
+    <p:sldId id="262" r:id="rId11"/>
+    <p:sldId id="263" r:id="rId12"/>
   </p:sldIdLst>
   <p:sldSz cx="10080625" cy="5670550"/>
   <p:notesSz cx="7559675" cy="10691813"/>
@@ -68,7 +72,7 @@
         <p:txBody>
           <a:bodyPr/>
           <a:p>
-            <a:fld id="{366055ED-72B7-4EBB-94BD-B745543BF593}" type="slidenum">
+            <a:fld id="{4D4C68FD-C3E4-4AA9-BC18-4A8227E8ED12}" type="slidenum">
               <a:t>&lt;#&gt;</a:t>
             </a:fld>
           </a:p>
@@ -277,7 +281,7 @@
         <p:txBody>
           <a:bodyPr/>
           <a:p>
-            <a:fld id="{D263E6F3-A0E0-4372-A78B-04F5AC7F8299}" type="slidenum">
+            <a:fld id="{76D7F4C7-50E2-42E4-93C3-78DCDD095132}" type="slidenum">
               <a:t>&lt;#&gt;</a:t>
             </a:fld>
           </a:p>
@@ -572,7 +576,7 @@
         <p:txBody>
           <a:bodyPr/>
           <a:p>
-            <a:fld id="{8582EB6E-C48F-4E14-9E3F-8406D7796576}" type="slidenum">
+            <a:fld id="{93896F2E-9462-44C0-9D80-49201559B9D8}" type="slidenum">
               <a:t>&lt;#&gt;</a:t>
             </a:fld>
           </a:p>
@@ -953,7 +957,7 @@
         <p:txBody>
           <a:bodyPr/>
           <a:p>
-            <a:fld id="{B227C843-C5DC-4B75-8E6B-9DD50ED0FD35}" type="slidenum">
+            <a:fld id="{64A80C73-7986-4679-92FB-63E377E02FEF}" type="slidenum">
               <a:t>&lt;#&gt;</a:t>
             </a:fld>
           </a:p>
@@ -1036,7 +1040,7 @@
         <p:txBody>
           <a:bodyPr/>
           <a:p>
-            <a:fld id="{BD897A57-A3BC-4FD8-94AD-6B75EADE4F5B}" type="slidenum">
+            <a:fld id="{E11210D1-2614-4622-B879-214878F43E1E}" type="slidenum">
               <a:t>&lt;#&gt;</a:t>
             </a:fld>
           </a:p>
@@ -1199,7 +1203,7 @@
         <p:txBody>
           <a:bodyPr/>
           <a:p>
-            <a:fld id="{3F8150FB-9A77-4146-8A46-8F861B35E7C4}" type="slidenum">
+            <a:fld id="{7194A5BC-CD0B-4373-A13F-7CC454D15B9B}" type="slidenum">
               <a:t>&lt;#&gt;</a:t>
             </a:fld>
           </a:p>
@@ -1365,7 +1369,7 @@
         <p:txBody>
           <a:bodyPr/>
           <a:p>
-            <a:fld id="{6B5AD3FE-8B6C-4E99-ADA2-A7374C8ED8B9}" type="slidenum">
+            <a:fld id="{1362A452-7BDB-450F-AFD6-E15978D56DE9}" type="slidenum">
               <a:t>&lt;#&gt;</a:t>
             </a:fld>
           </a:p>
@@ -1574,7 +1578,7 @@
         <p:txBody>
           <a:bodyPr/>
           <a:p>
-            <a:fld id="{1D3C8929-D890-4C3D-B81F-9F2A8CD48842}" type="slidenum">
+            <a:fld id="{65946AA7-C348-4CE4-AECA-D60D5D83BA65}" type="slidenum">
               <a:t>&lt;#&gt;</a:t>
             </a:fld>
           </a:p>
@@ -1697,7 +1701,7 @@
         <p:txBody>
           <a:bodyPr/>
           <a:p>
-            <a:fld id="{67711F2D-58A2-470F-9DB9-DF6FF48BD077}" type="slidenum">
+            <a:fld id="{6B474792-E148-4DC7-BB7F-3981EF1415F5}" type="slidenum">
               <a:t>&lt;#&gt;</a:t>
             </a:fld>
           </a:p>
@@ -1818,7 +1822,7 @@
         <p:txBody>
           <a:bodyPr/>
           <a:p>
-            <a:fld id="{82F7E937-5E9D-4655-BC3A-81BBADC960E6}" type="slidenum">
+            <a:fld id="{096D170D-8974-4FC7-A888-1B6EB7CE9CE7}" type="slidenum">
               <a:t>&lt;#&gt;</a:t>
             </a:fld>
           </a:p>
@@ -2070,7 +2074,7 @@
         <p:txBody>
           <a:bodyPr/>
           <a:p>
-            <a:fld id="{977F2B82-6B38-4F22-A0C0-FCD88053EA8C}" type="slidenum">
+            <a:fld id="{9FA3FA74-7953-41C8-B344-D38A0856277B}" type="slidenum">
               <a:t>&lt;#&gt;</a:t>
             </a:fld>
           </a:p>
@@ -2233,7 +2237,7 @@
         <p:txBody>
           <a:bodyPr/>
           <a:p>
-            <a:fld id="{31B33023-269F-476C-A1E1-93AA42D6223E}" type="slidenum">
+            <a:fld id="{912FAA2D-A74B-4394-BBED-0DA77DC1B759}" type="slidenum">
               <a:t>&lt;#&gt;</a:t>
             </a:fld>
           </a:p>
@@ -2485,7 +2489,7 @@
         <p:txBody>
           <a:bodyPr/>
           <a:p>
-            <a:fld id="{6D437366-E288-4360-B97F-C0B0949C46B4}" type="slidenum">
+            <a:fld id="{96F03BFB-EBA6-43E5-9D3F-2D1A6DA74965}" type="slidenum">
               <a:t>&lt;#&gt;</a:t>
             </a:fld>
           </a:p>
@@ -2737,7 +2741,7 @@
         <p:txBody>
           <a:bodyPr/>
           <a:p>
-            <a:fld id="{09535195-7C76-4773-9CCF-D9BE1B181BAD}" type="slidenum">
+            <a:fld id="{AE82EA0C-1BE1-4A9C-9DBF-CC250CB2E91D}" type="slidenum">
               <a:t>&lt;#&gt;</a:t>
             </a:fld>
           </a:p>
@@ -2946,7 +2950,7 @@
         <p:txBody>
           <a:bodyPr/>
           <a:p>
-            <a:fld id="{DE7C0780-7747-4372-8CD0-13261C2637BE}" type="slidenum">
+            <a:fld id="{05034A1F-FE9B-4F16-B6EC-AD9BC9687D77}" type="slidenum">
               <a:t>&lt;#&gt;</a:t>
             </a:fld>
           </a:p>
@@ -3241,7 +3245,7 @@
         <p:txBody>
           <a:bodyPr/>
           <a:p>
-            <a:fld id="{D7A4264C-63C3-4297-8407-3D996B53A2BB}" type="slidenum">
+            <a:fld id="{CF4DADC5-5725-4C24-B277-56273BC210F3}" type="slidenum">
               <a:t>&lt;#&gt;</a:t>
             </a:fld>
           </a:p>
@@ -3622,7 +3626,7 @@
         <p:txBody>
           <a:bodyPr/>
           <a:p>
-            <a:fld id="{87A91A9C-BA98-4BBA-82D6-F8D48CCA6B19}" type="slidenum">
+            <a:fld id="{45ABB6F9-56B8-45C4-B352-2F68365A99BE}" type="slidenum">
               <a:t>&lt;#&gt;</a:t>
             </a:fld>
           </a:p>
@@ -3705,7 +3709,7 @@
         <p:txBody>
           <a:bodyPr/>
           <a:p>
-            <a:fld id="{03C5D0A9-B563-4220-AABA-695D53B1C484}" type="slidenum">
+            <a:fld id="{D52CCC09-2CE2-4012-ADCB-5665E15035EC}" type="slidenum">
               <a:t>&lt;#&gt;</a:t>
             </a:fld>
           </a:p>
@@ -3868,7 +3872,7 @@
         <p:txBody>
           <a:bodyPr/>
           <a:p>
-            <a:fld id="{7193F0AA-AF01-4FA6-9E89-A04638693EBD}" type="slidenum">
+            <a:fld id="{2BFCEFD8-0F49-4B80-9B92-D16AF39BE283}" type="slidenum">
               <a:t>&lt;#&gt;</a:t>
             </a:fld>
           </a:p>
@@ -4034,7 +4038,7 @@
         <p:txBody>
           <a:bodyPr/>
           <a:p>
-            <a:fld id="{3D9249FF-C126-4436-A0E6-2EAB2205114A}" type="slidenum">
+            <a:fld id="{E403DC5B-7B05-410D-86C4-C0E42417CC61}" type="slidenum">
               <a:t>&lt;#&gt;</a:t>
             </a:fld>
           </a:p>
@@ -4243,7 +4247,7 @@
         <p:txBody>
           <a:bodyPr/>
           <a:p>
-            <a:fld id="{CD633160-7CCF-4815-A29E-E130030C10E3}" type="slidenum">
+            <a:fld id="{77836276-1CC0-4238-BEFD-D312C3363D7C}" type="slidenum">
               <a:t>&lt;#&gt;</a:t>
             </a:fld>
           </a:p>
@@ -4366,7 +4370,7 @@
         <p:txBody>
           <a:bodyPr/>
           <a:p>
-            <a:fld id="{EF36DC79-AEF0-4C85-AC80-CDE537C324CE}" type="slidenum">
+            <a:fld id="{205938A5-9D12-4E13-8C16-098DDE6E0A7E}" type="slidenum">
               <a:t>&lt;#&gt;</a:t>
             </a:fld>
           </a:p>
@@ -4532,7 +4536,7 @@
         <p:txBody>
           <a:bodyPr/>
           <a:p>
-            <a:fld id="{EF991D71-4101-41CD-A523-F63CCE7BFC67}" type="slidenum">
+            <a:fld id="{A104A1A3-4437-4A96-9E4F-B73E8C597B05}" type="slidenum">
               <a:t>&lt;#&gt;</a:t>
             </a:fld>
           </a:p>
@@ -4653,7 +4657,7 @@
         <p:txBody>
           <a:bodyPr/>
           <a:p>
-            <a:fld id="{A6289076-390A-4DBF-8552-543F2A546E02}" type="slidenum">
+            <a:fld id="{E86A1C99-57D9-494C-A843-FF78F2CF618C}" type="slidenum">
               <a:t>&lt;#&gt;</a:t>
             </a:fld>
           </a:p>
@@ -4905,7 +4909,7 @@
         <p:txBody>
           <a:bodyPr/>
           <a:p>
-            <a:fld id="{92FDB217-0DF9-4F95-80C0-60649CFDD1A8}" type="slidenum">
+            <a:fld id="{DF8DE850-F96C-4881-89BE-820BAD1999C7}" type="slidenum">
               <a:t>&lt;#&gt;</a:t>
             </a:fld>
           </a:p>
@@ -5157,7 +5161,7 @@
         <p:txBody>
           <a:bodyPr/>
           <a:p>
-            <a:fld id="{C2D57092-DDF0-4B77-8A62-2C0E5568AEA4}" type="slidenum">
+            <a:fld id="{676B1C79-25D5-4E04-8B8B-41CFD87A15D6}" type="slidenum">
               <a:t>&lt;#&gt;</a:t>
             </a:fld>
           </a:p>
@@ -5409,7 +5413,7 @@
         <p:txBody>
           <a:bodyPr/>
           <a:p>
-            <a:fld id="{D33A5E67-BCEC-44C3-8CE9-D9B56D6E2791}" type="slidenum">
+            <a:fld id="{153FE1F2-F8DF-46C4-942E-940499C7129F}" type="slidenum">
               <a:t>&lt;#&gt;</a:t>
             </a:fld>
           </a:p>
@@ -5618,7 +5622,7 @@
         <p:txBody>
           <a:bodyPr/>
           <a:p>
-            <a:fld id="{DC986C27-81C2-4784-BA32-7467FD136A37}" type="slidenum">
+            <a:fld id="{6DE31932-1DBA-4C78-8BE8-C8CAA053C1CF}" type="slidenum">
               <a:t>&lt;#&gt;</a:t>
             </a:fld>
           </a:p>
@@ -5913,7 +5917,7 @@
         <p:txBody>
           <a:bodyPr/>
           <a:p>
-            <a:fld id="{25C47C9D-5DB9-40C3-A170-72951B430697}" type="slidenum">
+            <a:fld id="{B56B9309-7653-4486-98F7-C61442643215}" type="slidenum">
               <a:t>&lt;#&gt;</a:t>
             </a:fld>
           </a:p>
@@ -6294,7 +6298,7 @@
         <p:txBody>
           <a:bodyPr/>
           <a:p>
-            <a:fld id="{0D776E9C-6D77-4A39-8953-81722B5132E5}" type="slidenum">
+            <a:fld id="{D9D4A5D2-80E7-484B-8926-12344BFDCC67}" type="slidenum">
               <a:t>&lt;#&gt;</a:t>
             </a:fld>
           </a:p>
@@ -6503,7 +6507,7 @@
         <p:txBody>
           <a:bodyPr/>
           <a:p>
-            <a:fld id="{E975ACA5-D291-4E6E-B921-3100D55A3734}" type="slidenum">
+            <a:fld id="{B42616D9-A546-482B-BB37-051C1E779256}" type="slidenum">
               <a:t>&lt;#&gt;</a:t>
             </a:fld>
           </a:p>
@@ -6626,7 +6630,7 @@
         <p:txBody>
           <a:bodyPr/>
           <a:p>
-            <a:fld id="{94411302-6856-4C0F-B80F-1FD33AAECB5E}" type="slidenum">
+            <a:fld id="{68C6BE38-CE9C-426D-95F0-879F64C05ED3}" type="slidenum">
               <a:t>&lt;#&gt;</a:t>
             </a:fld>
           </a:p>
@@ -6747,7 +6751,7 @@
         <p:txBody>
           <a:bodyPr/>
           <a:p>
-            <a:fld id="{8ECB8AD1-DB8A-4AE9-9F4E-A199A9C488A0}" type="slidenum">
+            <a:fld id="{81D1D583-E9F7-44F4-A200-59F54FB8AA82}" type="slidenum">
               <a:t>&lt;#&gt;</a:t>
             </a:fld>
           </a:p>
@@ -6999,7 +7003,7 @@
         <p:txBody>
           <a:bodyPr/>
           <a:p>
-            <a:fld id="{FE788FE0-20F5-4F93-81E6-DD9551FBBFCC}" type="slidenum">
+            <a:fld id="{F0856E6D-CEDD-42F8-9C2F-BC46DAEEBCD9}" type="slidenum">
               <a:t>&lt;#&gt;</a:t>
             </a:fld>
           </a:p>
@@ -7251,7 +7255,7 @@
         <p:txBody>
           <a:bodyPr/>
           <a:p>
-            <a:fld id="{B6ADB62A-BAC5-4CEA-AB44-EA2B5451C47A}" type="slidenum">
+            <a:fld id="{DC00000A-B718-49EB-85EF-CA47E11F8F18}" type="slidenum">
               <a:t>&lt;#&gt;</a:t>
             </a:fld>
           </a:p>
@@ -7503,7 +7507,7 @@
         <p:txBody>
           <a:bodyPr/>
           <a:p>
-            <a:fld id="{6D8F4045-6628-4D0B-8A5F-5724DD72EB14}" type="slidenum">
+            <a:fld id="{DC023B2B-D417-4E27-B3AF-268705BE5F6F}" type="slidenum">
               <a:t>&lt;#&gt;</a:t>
             </a:fld>
           </a:p>
@@ -8037,7 +8041,7 @@
             <a:pPr indent="0" algn="r">
               <a:buNone/>
             </a:pPr>
-            <a:fld id="{A87C739A-8BF7-4EA5-962D-DBE75CEDF48D}" type="slidenum">
+            <a:fld id="{2EA712C0-4A8D-4173-9434-54A795D7778A}" type="slidenum">
               <a:rPr b="0" lang="en-US" sz="1400" spc="-1" strike="noStrike">
                 <a:solidFill>
                   <a:srgbClr val="ffffff"/>
@@ -8736,7 +8740,7 @@
           </a:bodyPr>
           <a:p>
             <a:pPr algn="r"/>
-            <a:fld id="{C8BA2C84-C53D-4F78-A7E7-5D4D75414E6E}" type="slidenum">
+            <a:fld id="{EE21C593-5824-4106-8180-2636051833AE}" type="slidenum">
               <a:rPr b="0" lang="en-US" sz="1400" spc="-1" strike="noStrike">
                 <a:solidFill>
                   <a:srgbClr val="ffffff"/>
@@ -9667,7 +9671,7 @@
             <a:pPr indent="0" algn="r">
               <a:buNone/>
             </a:pPr>
-            <a:fld id="{B73359FB-3E8D-473F-B75A-0EE7A202292B}" type="slidenum">
+            <a:fld id="{C6C46D68-C797-47AE-B639-E985C6B1C065}" type="slidenum">
               <a:rPr b="0" lang="en-US" sz="1400" spc="-1" strike="noStrike">
                 <a:solidFill>
                   <a:srgbClr val="ffffff"/>
@@ -9934,7 +9938,7 @@
           </a:bodyPr>
           <a:p>
             <a:pPr algn="r"/>
-            <a:fld id="{5E4C91DA-0B30-4831-9856-03BF118E286A}" type="slidenum">
+            <a:fld id="{FB5F0C2E-D5AD-46D6-9A2C-B2849A7A8392}" type="slidenum">
               <a:rPr b="0" lang="en-US" sz="1400" spc="-1" strike="noStrike">
                 <a:solidFill>
                   <a:srgbClr val="000000"/>
@@ -10560,7 +10564,7 @@
             <a:pPr indent="0" algn="r">
               <a:buNone/>
             </a:pPr>
-            <a:fld id="{D06FD29D-1619-4D8C-BB12-124BA05DEEF6}" type="slidenum">
+            <a:fld id="{113B6000-078E-48BD-90C4-DBA2B598F4BE}" type="slidenum">
               <a:rPr b="0" lang="en-US" sz="1400" spc="-1" strike="noStrike">
                 <a:solidFill>
                   <a:srgbClr val="000000"/>
@@ -10799,7 +10803,7 @@
                 </a:solidFill>
                 <a:latin typeface="Arial"/>
               </a:rPr>
-              <a:t>Why?</a:t>
+              <a:t>Why Rewrite Pace.edu?</a:t>
             </a:r>
             <a:endParaRPr b="0" lang="en-US" sz="3300" spc="-1" strike="noStrike">
               <a:solidFill>
@@ -11016,8 +11020,8 @@
         </p:nvSpPr>
         <p:spPr>
           <a:xfrm>
-            <a:off x="504000" y="1428840"/>
-            <a:ext cx="9071640" cy="2914560"/>
+            <a:off x="540000" y="270000"/>
+            <a:ext cx="9000000" cy="990000"/>
           </a:xfrm>
           <a:prstGeom prst="rect">
             <a:avLst/>
@@ -11036,17 +11040,153 @@
               <a:buNone/>
             </a:pPr>
             <a:r>
-              <a:rPr b="0" lang="en-US" sz="7200" spc="-1" strike="noStrike">
+              <a:rPr b="0" lang="en-US" sz="3300" spc="-1" strike="noStrike">
                 <a:solidFill>
                   <a:srgbClr val="ffffff"/>
                 </a:solidFill>
                 <a:latin typeface="Arial"/>
               </a:rPr>
-              <a:t>Demonstration</a:t>
-            </a:r>
-            <a:endParaRPr b="0" lang="en-US" sz="7200" spc="-1" strike="noStrike">
+              <a:t>Layout</a:t>
+            </a:r>
+            <a:endParaRPr b="0" lang="en-US" sz="3300" spc="-1" strike="noStrike">
               <a:solidFill>
                 <a:srgbClr val="ffffff"/>
+              </a:solidFill>
+              <a:latin typeface="Arial"/>
+            </a:endParaRPr>
+          </a:p>
+        </p:txBody>
+      </p:sp>
+      <p:sp>
+        <p:nvSpPr>
+          <p:cNvPr id="164" name="PlaceHolder 2"/>
+          <p:cNvSpPr>
+            <a:spLocks noGrp="1"/>
+          </p:cNvSpPr>
+          <p:nvPr>
+            <p:ph/>
+          </p:nvPr>
+        </p:nvSpPr>
+        <p:spPr>
+          <a:xfrm>
+            <a:off x="540000" y="2057400"/>
+            <a:ext cx="9000000" cy="2982600"/>
+          </a:xfrm>
+          <a:prstGeom prst="rect">
+            <a:avLst/>
+          </a:prstGeom>
+          <a:noFill/>
+          <a:ln w="0">
+            <a:noFill/>
+          </a:ln>
+        </p:spPr>
+        <p:txBody>
+          <a:bodyPr lIns="0" rIns="0" tIns="0" bIns="0" anchor="t">
+            <a:normAutofit/>
+          </a:bodyPr>
+          <a:p>
+            <a:pPr marL="432000" indent="0">
+              <a:spcAft>
+                <a:spcPts val="1057"/>
+              </a:spcAft>
+              <a:buNone/>
+            </a:pPr>
+            <a:r>
+              <a:rPr b="0" lang="en-US" sz="2400" spc="-1" strike="noStrike">
+                <a:solidFill>
+                  <a:srgbClr val="000000"/>
+                </a:solidFill>
+                <a:latin typeface="Arial"/>
+              </a:rPr>
+              <a:t>We went with a hierarchical layout:</a:t>
+            </a:r>
+            <a:endParaRPr b="0" lang="en-US" sz="2400" spc="-1" strike="noStrike">
+              <a:solidFill>
+                <a:srgbClr val="000000"/>
+              </a:solidFill>
+              <a:latin typeface="Arial"/>
+            </a:endParaRPr>
+          </a:p>
+          <a:p>
+            <a:pPr marL="432000" indent="-324000">
+              <a:spcAft>
+                <a:spcPts val="1057"/>
+              </a:spcAft>
+              <a:buClr>
+                <a:srgbClr val="000000"/>
+              </a:buClr>
+              <a:buSzPct val="45000"/>
+              <a:buFont typeface="Wingdings" charset="2"/>
+              <a:buChar char=""/>
+            </a:pPr>
+            <a:r>
+              <a:rPr b="0" lang="en-US" sz="2400" spc="-1" strike="noStrike">
+                <a:solidFill>
+                  <a:srgbClr val="000000"/>
+                </a:solidFill>
+                <a:latin typeface="Arial"/>
+              </a:rPr>
+              <a:t>Different people with different needs will use this site</a:t>
+            </a:r>
+            <a:endParaRPr b="0" lang="en-US" sz="2400" spc="-1" strike="noStrike">
+              <a:solidFill>
+                <a:srgbClr val="000000"/>
+              </a:solidFill>
+              <a:latin typeface="Arial"/>
+            </a:endParaRPr>
+          </a:p>
+          <a:p>
+            <a:pPr marL="432000" indent="-324000">
+              <a:spcAft>
+                <a:spcPts val="1057"/>
+              </a:spcAft>
+              <a:buClr>
+                <a:srgbClr val="000000"/>
+              </a:buClr>
+              <a:buSzPct val="45000"/>
+              <a:buFont typeface="Wingdings" charset="2"/>
+              <a:buChar char=""/>
+            </a:pPr>
+            <a:r>
+              <a:rPr b="0" lang="en-US" sz="2400" spc="-1" strike="noStrike">
+                <a:solidFill>
+                  <a:srgbClr val="000000"/>
+                </a:solidFill>
+                <a:latin typeface="Arial"/>
+              </a:rPr>
+              <a:t>This makes it quicker to get to the pages you care about</a:t>
+            </a:r>
+            <a:endParaRPr b="0" lang="en-US" sz="2400" spc="-1" strike="noStrike">
+              <a:solidFill>
+                <a:srgbClr val="000000"/>
+              </a:solidFill>
+              <a:latin typeface="Arial"/>
+            </a:endParaRPr>
+          </a:p>
+          <a:p>
+            <a:pPr marL="432000" indent="-324000">
+              <a:spcAft>
+                <a:spcPts val="1057"/>
+              </a:spcAft>
+              <a:buClr>
+                <a:srgbClr val="000000"/>
+              </a:buClr>
+              <a:buSzPct val="45000"/>
+              <a:buFont typeface="Wingdings" charset="2"/>
+              <a:buChar char=""/>
+            </a:pPr>
+            <a:r>
+              <a:rPr b="0" lang="en-US" sz="2400" spc="-1" strike="noStrike">
+                <a:solidFill>
+                  <a:srgbClr val="000000"/>
+                </a:solidFill>
+                <a:latin typeface="Arial"/>
+              </a:rPr>
+              <a:t>Its more organized than the current random assortment of pages on the Pace website</a:t>
+            </a:r>
+            <a:endParaRPr b="0" lang="en-US" sz="2400" spc="-1" strike="noStrike">
+              <a:solidFill>
+                <a:srgbClr val="000000"/>
               </a:solidFill>
               <a:latin typeface="Arial"/>
             </a:endParaRPr>
@@ -11085,7 +11225,647 @@
       </p:grpSpPr>
       <p:sp>
         <p:nvSpPr>
-          <p:cNvPr id="164" name="PlaceHolder 1"/>
+          <p:cNvPr id="165" name="PlaceHolder 1"/>
+          <p:cNvSpPr>
+            <a:spLocks noGrp="1"/>
+          </p:cNvSpPr>
+          <p:nvPr>
+            <p:ph type="title"/>
+          </p:nvPr>
+        </p:nvSpPr>
+        <p:spPr>
+          <a:xfrm>
+            <a:off x="540000" y="270000"/>
+            <a:ext cx="9000000" cy="990000"/>
+          </a:xfrm>
+          <a:prstGeom prst="rect">
+            <a:avLst/>
+          </a:prstGeom>
+          <a:noFill/>
+          <a:ln w="0">
+            <a:noFill/>
+          </a:ln>
+        </p:spPr>
+        <p:txBody>
+          <a:bodyPr lIns="0" rIns="0" tIns="0" bIns="0" anchor="ctr">
+            <a:noAutofit/>
+          </a:bodyPr>
+          <a:p>
+            <a:pPr indent="0" algn="ctr">
+              <a:buNone/>
+            </a:pPr>
+            <a:r>
+              <a:rPr b="0" lang="en-US" sz="3300" spc="-1" strike="noStrike">
+                <a:solidFill>
+                  <a:srgbClr val="ffffff"/>
+                </a:solidFill>
+                <a:latin typeface="Arial"/>
+              </a:rPr>
+              <a:t>Images</a:t>
+            </a:r>
+            <a:endParaRPr b="0" lang="en-US" sz="3300" spc="-1" strike="noStrike">
+              <a:solidFill>
+                <a:srgbClr val="ffffff"/>
+              </a:solidFill>
+              <a:latin typeface="Arial"/>
+            </a:endParaRPr>
+          </a:p>
+        </p:txBody>
+      </p:sp>
+      <p:sp>
+        <p:nvSpPr>
+          <p:cNvPr id="166" name="PlaceHolder 2"/>
+          <p:cNvSpPr>
+            <a:spLocks noGrp="1"/>
+          </p:cNvSpPr>
+          <p:nvPr>
+            <p:ph/>
+          </p:nvPr>
+        </p:nvSpPr>
+        <p:spPr>
+          <a:xfrm>
+            <a:off x="540000" y="2057400"/>
+            <a:ext cx="9000000" cy="2982600"/>
+          </a:xfrm>
+          <a:prstGeom prst="rect">
+            <a:avLst/>
+          </a:prstGeom>
+          <a:noFill/>
+          <a:ln w="0">
+            <a:noFill/>
+          </a:ln>
+        </p:spPr>
+        <p:txBody>
+          <a:bodyPr lIns="0" rIns="0" tIns="0" bIns="0" anchor="t">
+            <a:normAutofit/>
+          </a:bodyPr>
+          <a:p>
+            <a:pPr marL="432000" indent="0">
+              <a:spcAft>
+                <a:spcPts val="1057"/>
+              </a:spcAft>
+              <a:buNone/>
+            </a:pPr>
+            <a:r>
+              <a:rPr b="0" lang="en-US" sz="2400" spc="-1" strike="noStrike">
+                <a:solidFill>
+                  <a:srgbClr val="000000"/>
+                </a:solidFill>
+                <a:latin typeface="Arial"/>
+              </a:rPr>
+              <a:t>We Used few images to:</a:t>
+            </a:r>
+            <a:endParaRPr b="0" lang="en-US" sz="2400" spc="-1" strike="noStrike">
+              <a:solidFill>
+                <a:srgbClr val="000000"/>
+              </a:solidFill>
+              <a:latin typeface="Arial"/>
+            </a:endParaRPr>
+          </a:p>
+          <a:p>
+            <a:pPr marL="432000" indent="-324000">
+              <a:spcAft>
+                <a:spcPts val="1057"/>
+              </a:spcAft>
+              <a:buClr>
+                <a:srgbClr val="000000"/>
+              </a:buClr>
+              <a:buSzPct val="45000"/>
+              <a:buFont typeface="Wingdings" charset="2"/>
+              <a:buChar char=""/>
+            </a:pPr>
+            <a:r>
+              <a:rPr b="0" lang="en-US" sz="2400" spc="-1" strike="noStrike">
+                <a:solidFill>
+                  <a:srgbClr val="000000"/>
+                </a:solidFill>
+                <a:latin typeface="Arial"/>
+              </a:rPr>
+              <a:t>Keep the page less cluttered</a:t>
+            </a:r>
+            <a:endParaRPr b="0" lang="en-US" sz="2400" spc="-1" strike="noStrike">
+              <a:solidFill>
+                <a:srgbClr val="000000"/>
+              </a:solidFill>
+              <a:latin typeface="Arial"/>
+            </a:endParaRPr>
+          </a:p>
+          <a:p>
+            <a:pPr marL="432000" indent="-324000">
+              <a:spcAft>
+                <a:spcPts val="1057"/>
+              </a:spcAft>
+              <a:buClr>
+                <a:srgbClr val="000000"/>
+              </a:buClr>
+              <a:buSzPct val="45000"/>
+              <a:buFont typeface="Wingdings" charset="2"/>
+              <a:buChar char=""/>
+            </a:pPr>
+            <a:r>
+              <a:rPr b="0" lang="en-US" sz="2400" spc="-1" strike="noStrike">
+                <a:solidFill>
+                  <a:srgbClr val="000000"/>
+                </a:solidFill>
+                <a:latin typeface="Arial"/>
+              </a:rPr>
+              <a:t>Help the website load faster</a:t>
+            </a:r>
+            <a:endParaRPr b="0" lang="en-US" sz="2400" spc="-1" strike="noStrike">
+              <a:solidFill>
+                <a:srgbClr val="000000"/>
+              </a:solidFill>
+              <a:latin typeface="Arial"/>
+            </a:endParaRPr>
+          </a:p>
+          <a:p>
+            <a:pPr marL="432000" indent="-324000">
+              <a:spcAft>
+                <a:spcPts val="1057"/>
+              </a:spcAft>
+              <a:buClr>
+                <a:srgbClr val="000000"/>
+              </a:buClr>
+              <a:buSzPct val="45000"/>
+              <a:buFont typeface="Wingdings" charset="2"/>
+              <a:buChar char=""/>
+            </a:pPr>
+            <a:r>
+              <a:rPr b="0" lang="en-US" sz="2400" spc="-1" strike="noStrike">
+                <a:solidFill>
+                  <a:srgbClr val="000000"/>
+                </a:solidFill>
+                <a:latin typeface="Arial"/>
+              </a:rPr>
+              <a:t>Keep the focus on the important content</a:t>
+            </a:r>
+            <a:endParaRPr b="0" lang="en-US" sz="2400" spc="-1" strike="noStrike">
+              <a:solidFill>
+                <a:srgbClr val="000000"/>
+              </a:solidFill>
+              <a:latin typeface="Arial"/>
+            </a:endParaRPr>
+          </a:p>
+        </p:txBody>
+      </p:sp>
+    </p:spTree>
+  </p:cSld>
+  <mc:AlternateContent>
+    <mc:Choice Requires="p14">
+      <p:transition spd="slow" p14:dur="2000"/>
+    </mc:Choice>
+    <mc:Fallback>
+      <p:transition spd="slow"/>
+    </mc:Fallback>
+  </mc:AlternateContent>
+</p:sld>
+</file>
+
+<file path=ppt/slides/slide5.xml><?xml version="1.0" encoding="utf-8"?>
+<p:sld xmlns:a="http://schemas.openxmlformats.org/drawingml/2006/main" xmlns:p="http://schemas.openxmlformats.org/presentationml/2006/main" xmlns:r="http://schemas.openxmlformats.org/officeDocument/2006/relationships" xmlns:p14="http://schemas.microsoft.com/office/powerpoint/2010/main" xmlns:p15="http://schemas.microsoft.com/office/powerpoint/2012/main" xmlns:mc="http://schemas.openxmlformats.org/markup-compatibility/2006">
+  <p:cSld>
+    <p:spTree>
+      <p:nvGrpSpPr>
+        <p:cNvPr id="1" name=""/>
+        <p:cNvGrpSpPr/>
+        <p:nvPr/>
+      </p:nvGrpSpPr>
+      <p:grpSpPr>
+        <a:xfrm>
+          <a:off x="0" y="0"/>
+          <a:ext cx="0" cy="0"/>
+          <a:chOff x="0" y="0"/>
+          <a:chExt cx="0" cy="0"/>
+        </a:xfrm>
+      </p:grpSpPr>
+      <p:sp>
+        <p:nvSpPr>
+          <p:cNvPr id="167" name="PlaceHolder 1"/>
+          <p:cNvSpPr>
+            <a:spLocks noGrp="1"/>
+          </p:cNvSpPr>
+          <p:nvPr>
+            <p:ph type="title"/>
+          </p:nvPr>
+        </p:nvSpPr>
+        <p:spPr>
+          <a:xfrm>
+            <a:off x="540000" y="270000"/>
+            <a:ext cx="9000000" cy="990000"/>
+          </a:xfrm>
+          <a:prstGeom prst="rect">
+            <a:avLst/>
+          </a:prstGeom>
+          <a:noFill/>
+          <a:ln w="0">
+            <a:noFill/>
+          </a:ln>
+        </p:spPr>
+        <p:txBody>
+          <a:bodyPr lIns="0" rIns="0" tIns="0" bIns="0" anchor="ctr">
+            <a:noAutofit/>
+          </a:bodyPr>
+          <a:p>
+            <a:pPr indent="0" algn="ctr">
+              <a:buNone/>
+            </a:pPr>
+            <a:r>
+              <a:rPr b="0" lang="en-US" sz="3300" spc="-1" strike="noStrike">
+                <a:solidFill>
+                  <a:srgbClr val="ffffff"/>
+                </a:solidFill>
+                <a:latin typeface="Arial"/>
+              </a:rPr>
+              <a:t>Responsiveness</a:t>
+            </a:r>
+            <a:endParaRPr b="0" lang="en-US" sz="3300" spc="-1" strike="noStrike">
+              <a:solidFill>
+                <a:srgbClr val="ffffff"/>
+              </a:solidFill>
+              <a:latin typeface="Arial"/>
+            </a:endParaRPr>
+          </a:p>
+        </p:txBody>
+      </p:sp>
+      <p:sp>
+        <p:nvSpPr>
+          <p:cNvPr id="168" name="PlaceHolder 2"/>
+          <p:cNvSpPr>
+            <a:spLocks noGrp="1"/>
+          </p:cNvSpPr>
+          <p:nvPr>
+            <p:ph/>
+          </p:nvPr>
+        </p:nvSpPr>
+        <p:spPr>
+          <a:xfrm>
+            <a:off x="540000" y="1260000"/>
+            <a:ext cx="9000000" cy="3997800"/>
+          </a:xfrm>
+          <a:prstGeom prst="rect">
+            <a:avLst/>
+          </a:prstGeom>
+          <a:noFill/>
+          <a:ln w="0">
+            <a:noFill/>
+          </a:ln>
+        </p:spPr>
+        <p:txBody>
+          <a:bodyPr lIns="0" rIns="0" tIns="0" bIns="0" anchor="t">
+            <a:normAutofit/>
+          </a:bodyPr>
+          <a:p>
+            <a:pPr marL="432000" indent="0">
+              <a:spcAft>
+                <a:spcPts val="1057"/>
+              </a:spcAft>
+              <a:buNone/>
+            </a:pPr>
+            <a:r>
+              <a:rPr b="0" lang="en-US" sz="2400" spc="-1" strike="noStrike">
+                <a:solidFill>
+                  <a:srgbClr val="000000"/>
+                </a:solidFill>
+                <a:latin typeface="Arial"/>
+              </a:rPr>
+              <a:t>Looks incredible on desktop &amp; mobile</a:t>
+            </a:r>
+            <a:endParaRPr b="0" lang="en-US" sz="2400" spc="-1" strike="noStrike">
+              <a:solidFill>
+                <a:srgbClr val="000000"/>
+              </a:solidFill>
+              <a:latin typeface="Arial"/>
+            </a:endParaRPr>
+          </a:p>
+        </p:txBody>
+      </p:sp>
+    </p:spTree>
+  </p:cSld>
+  <mc:AlternateContent>
+    <mc:Choice Requires="p14">
+      <p:transition spd="slow" p14:dur="2000"/>
+    </mc:Choice>
+    <mc:Fallback>
+      <p:transition spd="slow"/>
+    </mc:Fallback>
+  </mc:AlternateContent>
+</p:sld>
+</file>
+
+<file path=ppt/slides/slide6.xml><?xml version="1.0" encoding="utf-8"?>
+<p:sld xmlns:a="http://schemas.openxmlformats.org/drawingml/2006/main" xmlns:p="http://schemas.openxmlformats.org/presentationml/2006/main" xmlns:r="http://schemas.openxmlformats.org/officeDocument/2006/relationships" xmlns:p14="http://schemas.microsoft.com/office/powerpoint/2010/main" xmlns:p15="http://schemas.microsoft.com/office/powerpoint/2012/main" xmlns:mc="http://schemas.openxmlformats.org/markup-compatibility/2006">
+  <p:cSld>
+    <p:spTree>
+      <p:nvGrpSpPr>
+        <p:cNvPr id="1" name=""/>
+        <p:cNvGrpSpPr/>
+        <p:nvPr/>
+      </p:nvGrpSpPr>
+      <p:grpSpPr>
+        <a:xfrm>
+          <a:off x="0" y="0"/>
+          <a:ext cx="0" cy="0"/>
+          <a:chOff x="0" y="0"/>
+          <a:chExt cx="0" cy="0"/>
+        </a:xfrm>
+      </p:grpSpPr>
+      <p:sp>
+        <p:nvSpPr>
+          <p:cNvPr id="169" name="PlaceHolder 1"/>
+          <p:cNvSpPr>
+            <a:spLocks noGrp="1"/>
+          </p:cNvSpPr>
+          <p:nvPr>
+            <p:ph type="title"/>
+          </p:nvPr>
+        </p:nvSpPr>
+        <p:spPr>
+          <a:xfrm>
+            <a:off x="504000" y="1428840"/>
+            <a:ext cx="9071640" cy="2914560"/>
+          </a:xfrm>
+          <a:prstGeom prst="rect">
+            <a:avLst/>
+          </a:prstGeom>
+          <a:noFill/>
+          <a:ln w="0">
+            <a:noFill/>
+          </a:ln>
+        </p:spPr>
+        <p:txBody>
+          <a:bodyPr lIns="0" rIns="0" tIns="0" bIns="0" anchor="ctr">
+            <a:noAutofit/>
+          </a:bodyPr>
+          <a:p>
+            <a:pPr indent="0" algn="ctr">
+              <a:buNone/>
+            </a:pPr>
+            <a:r>
+              <a:rPr b="0" lang="en-US" sz="7200" spc="-1" strike="noStrike">
+                <a:solidFill>
+                  <a:srgbClr val="ffffff"/>
+                </a:solidFill>
+                <a:latin typeface="Arial"/>
+              </a:rPr>
+              <a:t>Demonstration</a:t>
+            </a:r>
+            <a:endParaRPr b="0" lang="en-US" sz="7200" spc="-1" strike="noStrike">
+              <a:solidFill>
+                <a:srgbClr val="ffffff"/>
+              </a:solidFill>
+              <a:latin typeface="Arial"/>
+            </a:endParaRPr>
+          </a:p>
+        </p:txBody>
+      </p:sp>
+    </p:spTree>
+  </p:cSld>
+  <mc:AlternateContent>
+    <mc:Choice Requires="p14">
+      <p:transition spd="slow" p14:dur="2000"/>
+    </mc:Choice>
+    <mc:Fallback>
+      <p:transition spd="slow"/>
+    </mc:Fallback>
+  </mc:AlternateContent>
+</p:sld>
+</file>
+
+<file path=ppt/slides/slide7.xml><?xml version="1.0" encoding="utf-8"?>
+<p:sld xmlns:a="http://schemas.openxmlformats.org/drawingml/2006/main" xmlns:p="http://schemas.openxmlformats.org/presentationml/2006/main" xmlns:r="http://schemas.openxmlformats.org/officeDocument/2006/relationships" xmlns:p14="http://schemas.microsoft.com/office/powerpoint/2010/main" xmlns:p15="http://schemas.microsoft.com/office/powerpoint/2012/main" xmlns:mc="http://schemas.openxmlformats.org/markup-compatibility/2006">
+  <p:cSld>
+    <p:spTree>
+      <p:nvGrpSpPr>
+        <p:cNvPr id="1" name=""/>
+        <p:cNvGrpSpPr/>
+        <p:nvPr/>
+      </p:nvGrpSpPr>
+      <p:grpSpPr>
+        <a:xfrm>
+          <a:off x="0" y="0"/>
+          <a:ext cx="0" cy="0"/>
+          <a:chOff x="0" y="0"/>
+          <a:chExt cx="0" cy="0"/>
+        </a:xfrm>
+      </p:grpSpPr>
+      <p:sp>
+        <p:nvSpPr>
+          <p:cNvPr id="170" name="PlaceHolder 1"/>
+          <p:cNvSpPr>
+            <a:spLocks noGrp="1"/>
+          </p:cNvSpPr>
+          <p:nvPr>
+            <p:ph type="title"/>
+          </p:nvPr>
+        </p:nvSpPr>
+        <p:spPr>
+          <a:xfrm>
+            <a:off x="540000" y="270000"/>
+            <a:ext cx="9000000" cy="990000"/>
+          </a:xfrm>
+          <a:prstGeom prst="rect">
+            <a:avLst/>
+          </a:prstGeom>
+          <a:noFill/>
+          <a:ln w="0">
+            <a:noFill/>
+          </a:ln>
+        </p:spPr>
+        <p:txBody>
+          <a:bodyPr lIns="0" rIns="0" tIns="0" bIns="0" anchor="ctr">
+            <a:noAutofit/>
+          </a:bodyPr>
+          <a:p>
+            <a:pPr indent="0" algn="ctr">
+              <a:buNone/>
+            </a:pPr>
+            <a:r>
+              <a:rPr b="0" lang="en-US" sz="3300" spc="-1" strike="noStrike">
+                <a:solidFill>
+                  <a:srgbClr val="ffffff"/>
+                </a:solidFill>
+                <a:latin typeface="Arial"/>
+              </a:rPr>
+              <a:t>Preference</a:t>
+            </a:r>
+            <a:endParaRPr b="0" lang="en-US" sz="3300" spc="-1" strike="noStrike">
+              <a:solidFill>
+                <a:srgbClr val="ffffff"/>
+              </a:solidFill>
+              <a:latin typeface="Arial"/>
+            </a:endParaRPr>
+          </a:p>
+        </p:txBody>
+      </p:sp>
+      <p:sp>
+        <p:nvSpPr>
+          <p:cNvPr id="171" name="PlaceHolder 2"/>
+          <p:cNvSpPr>
+            <a:spLocks noGrp="1"/>
+          </p:cNvSpPr>
+          <p:nvPr>
+            <p:ph/>
+          </p:nvPr>
+        </p:nvSpPr>
+        <p:spPr>
+          <a:xfrm>
+            <a:off x="540000" y="2057400"/>
+            <a:ext cx="9000000" cy="2982600"/>
+          </a:xfrm>
+          <a:prstGeom prst="rect">
+            <a:avLst/>
+          </a:prstGeom>
+          <a:noFill/>
+          <a:ln w="0">
+            <a:noFill/>
+          </a:ln>
+        </p:spPr>
+        <p:txBody>
+          <a:bodyPr lIns="0" rIns="0" tIns="0" bIns="0" anchor="t">
+            <a:normAutofit/>
+          </a:bodyPr>
+          <a:p>
+            <a:pPr marL="432000" indent="0">
+              <a:spcAft>
+                <a:spcPts val="1057"/>
+              </a:spcAft>
+              <a:buNone/>
+            </a:pPr>
+            <a:r>
+              <a:rPr b="0" lang="en-US" sz="2400" spc="-1" strike="noStrike">
+                <a:solidFill>
+                  <a:srgbClr val="000000"/>
+                </a:solidFill>
+                <a:latin typeface="Arial"/>
+              </a:rPr>
+              <a:t>We Used few images to:</a:t>
+            </a:r>
+            <a:endParaRPr b="0" lang="en-US" sz="2400" spc="-1" strike="noStrike">
+              <a:solidFill>
+                <a:srgbClr val="000000"/>
+              </a:solidFill>
+              <a:latin typeface="Arial"/>
+            </a:endParaRPr>
+          </a:p>
+          <a:p>
+            <a:pPr marL="432000" indent="-324000">
+              <a:spcAft>
+                <a:spcPts val="1057"/>
+              </a:spcAft>
+              <a:buClr>
+                <a:srgbClr val="000000"/>
+              </a:buClr>
+              <a:buSzPct val="45000"/>
+              <a:buFont typeface="Wingdings" charset="2"/>
+              <a:buChar char=""/>
+            </a:pPr>
+            <a:r>
+              <a:rPr b="0" lang="en-US" sz="2400" spc="-1" strike="noStrike">
+                <a:solidFill>
+                  <a:srgbClr val="000000"/>
+                </a:solidFill>
+                <a:latin typeface="Arial"/>
+              </a:rPr>
+              <a:t>Keep the page less cluttered</a:t>
+            </a:r>
+            <a:endParaRPr b="0" lang="en-US" sz="2400" spc="-1" strike="noStrike">
+              <a:solidFill>
+                <a:srgbClr val="000000"/>
+              </a:solidFill>
+              <a:latin typeface="Arial"/>
+            </a:endParaRPr>
+          </a:p>
+          <a:p>
+            <a:pPr marL="432000" indent="-324000">
+              <a:spcAft>
+                <a:spcPts val="1057"/>
+              </a:spcAft>
+              <a:buClr>
+                <a:srgbClr val="000000"/>
+              </a:buClr>
+              <a:buSzPct val="45000"/>
+              <a:buFont typeface="Wingdings" charset="2"/>
+              <a:buChar char=""/>
+            </a:pPr>
+            <a:r>
+              <a:rPr b="0" lang="en-US" sz="2400" spc="-1" strike="noStrike">
+                <a:solidFill>
+                  <a:srgbClr val="000000"/>
+                </a:solidFill>
+                <a:latin typeface="Arial"/>
+              </a:rPr>
+              <a:t>Help the website load faster</a:t>
+            </a:r>
+            <a:endParaRPr b="0" lang="en-US" sz="2400" spc="-1" strike="noStrike">
+              <a:solidFill>
+                <a:srgbClr val="000000"/>
+              </a:solidFill>
+              <a:latin typeface="Arial"/>
+            </a:endParaRPr>
+          </a:p>
+          <a:p>
+            <a:pPr marL="432000" indent="-324000">
+              <a:spcAft>
+                <a:spcPts val="1057"/>
+              </a:spcAft>
+              <a:buClr>
+                <a:srgbClr val="000000"/>
+              </a:buClr>
+              <a:buSzPct val="45000"/>
+              <a:buFont typeface="Wingdings" charset="2"/>
+              <a:buChar char=""/>
+            </a:pPr>
+            <a:r>
+              <a:rPr b="0" lang="en-US" sz="2400" spc="-1" strike="noStrike">
+                <a:solidFill>
+                  <a:srgbClr val="000000"/>
+                </a:solidFill>
+                <a:latin typeface="Arial"/>
+              </a:rPr>
+              <a:t>Keep the focus on the important content</a:t>
+            </a:r>
+            <a:endParaRPr b="0" lang="en-US" sz="2400" spc="-1" strike="noStrike">
+              <a:solidFill>
+                <a:srgbClr val="000000"/>
+              </a:solidFill>
+              <a:latin typeface="Arial"/>
+            </a:endParaRPr>
+          </a:p>
+        </p:txBody>
+      </p:sp>
+    </p:spTree>
+  </p:cSld>
+  <mc:AlternateContent>
+    <mc:Choice Requires="p14">
+      <p:transition spd="slow" p14:dur="2000"/>
+    </mc:Choice>
+    <mc:Fallback>
+      <p:transition spd="slow"/>
+    </mc:Fallback>
+  </mc:AlternateContent>
+</p:sld>
+</file>
+
+<file path=ppt/slides/slide8.xml><?xml version="1.0" encoding="utf-8"?>
+<p:sld xmlns:a="http://schemas.openxmlformats.org/drawingml/2006/main" xmlns:p="http://schemas.openxmlformats.org/presentationml/2006/main" xmlns:r="http://schemas.openxmlformats.org/officeDocument/2006/relationships" xmlns:p14="http://schemas.microsoft.com/office/powerpoint/2010/main" xmlns:p15="http://schemas.microsoft.com/office/powerpoint/2012/main" xmlns:mc="http://schemas.openxmlformats.org/markup-compatibility/2006">
+  <p:cSld>
+    <p:spTree>
+      <p:nvGrpSpPr>
+        <p:cNvPr id="1" name=""/>
+        <p:cNvGrpSpPr/>
+        <p:nvPr/>
+      </p:nvGrpSpPr>
+      <p:grpSpPr>
+        <a:xfrm>
+          <a:off x="0" y="0"/>
+          <a:ext cx="0" cy="0"/>
+          <a:chOff x="0" y="0"/>
+          <a:chExt cx="0" cy="0"/>
+        </a:xfrm>
+      </p:grpSpPr>
+      <p:sp>
+        <p:nvSpPr>
+          <p:cNvPr id="172" name="PlaceHolder 1"/>
           <p:cNvSpPr>
             <a:spLocks noGrp="1"/>
           </p:cNvSpPr>
@@ -11134,7 +11914,7 @@
       </p:sp>
       <p:sp>
         <p:nvSpPr>
-          <p:cNvPr id="165" name="PlaceHolder 2"/>
+          <p:cNvPr id="173" name="PlaceHolder 2"/>
           <p:cNvSpPr>
             <a:spLocks noGrp="1"/>
           </p:cNvSpPr>

</xml_diff>